<commit_message>
ajout du slide chapters sur le pwt
</commit_message>
<xml_diff>
--- a/Deliverables/Presentation Spotify.pptx
+++ b/Deliverables/Presentation Spotify.pptx
@@ -6,47 +6,48 @@
     <p:sldMasterId id="2147483660" r:id="rId2"/>
   </p:sldMasterIdLst>
   <p:notesMasterIdLst>
-    <p:notesMasterId r:id="rId13"/>
+    <p:notesMasterId r:id="rId14"/>
   </p:notesMasterIdLst>
   <p:sldIdLst>
     <p:sldId id="256" r:id="rId3"/>
-    <p:sldId id="258" r:id="rId4"/>
-    <p:sldId id="259" r:id="rId5"/>
-    <p:sldId id="261" r:id="rId6"/>
-    <p:sldId id="274" r:id="rId7"/>
-    <p:sldId id="273" r:id="rId8"/>
-    <p:sldId id="264" r:id="rId9"/>
-    <p:sldId id="267" r:id="rId10"/>
-    <p:sldId id="269" r:id="rId11"/>
-    <p:sldId id="272" r:id="rId12"/>
+    <p:sldId id="275" r:id="rId4"/>
+    <p:sldId id="258" r:id="rId5"/>
+    <p:sldId id="259" r:id="rId6"/>
+    <p:sldId id="261" r:id="rId7"/>
+    <p:sldId id="274" r:id="rId8"/>
+    <p:sldId id="273" r:id="rId9"/>
+    <p:sldId id="264" r:id="rId10"/>
+    <p:sldId id="267" r:id="rId11"/>
+    <p:sldId id="269" r:id="rId12"/>
+    <p:sldId id="272" r:id="rId13"/>
   </p:sldIdLst>
   <p:sldSz cx="9144000" cy="5143500" type="screen16x9"/>
   <p:notesSz cx="6858000" cy="9144000"/>
   <p:embeddedFontLst>
     <p:embeddedFont>
       <p:font typeface="Inter" panose="020B0604020202020204" charset="0"/>
-      <p:regular r:id="rId14"/>
-      <p:bold r:id="rId15"/>
-      <p:italic r:id="rId16"/>
-      <p:boldItalic r:id="rId17"/>
+      <p:regular r:id="rId15"/>
+      <p:bold r:id="rId16"/>
+      <p:italic r:id="rId17"/>
+      <p:boldItalic r:id="rId18"/>
     </p:embeddedFont>
     <p:embeddedFont>
       <p:font typeface="Inter Medium" panose="020B0604020202020204" charset="0"/>
-      <p:regular r:id="rId18"/>
-      <p:bold r:id="rId19"/>
-      <p:italic r:id="rId20"/>
-      <p:boldItalic r:id="rId21"/>
+      <p:regular r:id="rId19"/>
+      <p:bold r:id="rId20"/>
+      <p:italic r:id="rId21"/>
+      <p:boldItalic r:id="rId22"/>
     </p:embeddedFont>
     <p:embeddedFont>
       <p:font typeface="Inter Semi Bold" panose="020B0604020202020204" charset="0"/>
-      <p:regular r:id="rId22"/>
+      <p:regular r:id="rId23"/>
     </p:embeddedFont>
     <p:embeddedFont>
       <p:font typeface="Inter SemiBold" panose="020B0604020202020204" charset="0"/>
-      <p:regular r:id="rId23"/>
-      <p:bold r:id="rId24"/>
-      <p:italic r:id="rId25"/>
-      <p:boldItalic r:id="rId26"/>
+      <p:regular r:id="rId24"/>
+      <p:bold r:id="rId25"/>
+      <p:italic r:id="rId26"/>
+      <p:boldItalic r:id="rId27"/>
     </p:embeddedFont>
   </p:embeddedFontLst>
   <p:defaultTextStyle>
@@ -294,10 +295,86 @@
       </p15:sldGuideLst>
     </p:ext>
     <p:ext uri="GoogleSlidesCustomDataVersion2">
-      <go:slidesCustomData xmlns="" xmlns:mc="http://schemas.openxmlformats.org/markup-compatibility/2006" xmlns:mv="urn:schemas-microsoft-com:mac:vml" xmlns:c="http://schemas.openxmlformats.org/drawingml/2006/chart" xmlns:dgm="http://schemas.openxmlformats.org/drawingml/2006/diagram" xmlns:o="urn:schemas-microsoft-com:office:office" xmlns:v="urn:schemas-microsoft-com:vml" xmlns:pvml="urn:schemas-microsoft-com:office:powerpoint" xmlns:com="http://schemas.openxmlformats.org/drawingml/2006/compatibility" xmlns:p14="http://schemas.microsoft.com/office/powerpoint/2010/main" xmlns:p15="http://schemas.microsoft.com/office/powerpoint/2012/main" xmlns:ahyp="http://schemas.microsoft.com/office/drawing/2018/hyperlinkcolor" xmlns:go="http://customooxmlschemas.google.com/" r:id="rId39" roundtripDataSignature="AMtx7mgs+zeGYRBCCZUbqzGSvGl4NYg/MA=="/>
+      <go:slidesCustomData xmlns:go="http://customooxmlschemas.google.com/" xmlns:ahyp="http://schemas.microsoft.com/office/drawing/2018/hyperlinkcolor" xmlns:p15="http://schemas.microsoft.com/office/powerpoint/2012/main" xmlns:p14="http://schemas.microsoft.com/office/powerpoint/2010/main" xmlns:com="http://schemas.openxmlformats.org/drawingml/2006/compatibility" xmlns:pvml="urn:schemas-microsoft-com:office:powerpoint" xmlns:v="urn:schemas-microsoft-com:vml" xmlns:o="urn:schemas-microsoft-com:office:office" xmlns:dgm="http://schemas.openxmlformats.org/drawingml/2006/diagram" xmlns:c="http://schemas.openxmlformats.org/drawingml/2006/chart" xmlns:mv="urn:schemas-microsoft-com:mac:vml" xmlns:mc="http://schemas.openxmlformats.org/markup-compatibility/2006" xmlns="" r:id="rId39" roundtripDataSignature="AMtx7mgs+zeGYRBCCZUbqzGSvGl4NYg/MA=="/>
     </p:ext>
   </p:extLst>
 </p:presentation>
+</file>
+
+<file path=ppt/changesInfos/changesInfo1.xml><?xml version="1.0" encoding="utf-8"?>
+<pc:chgInfo xmlns:a="http://schemas.openxmlformats.org/drawingml/2006/main" xmlns:r="http://schemas.openxmlformats.org/officeDocument/2006/relationships" xmlns:ac="http://schemas.microsoft.com/office/drawing/2013/main/command" xmlns:pc="http://schemas.microsoft.com/office/powerpoint/2013/main/command">
+  <pc:docChgLst>
+    <pc:chgData name="Arthur Mbomo" userId="11b0b643726c3bc0" providerId="LiveId" clId="{21932302-0433-4F80-9189-3850379D6620}"/>
+    <pc:docChg chg="undo custSel addSld modSld">
+      <pc:chgData name="Arthur Mbomo" userId="11b0b643726c3bc0" providerId="LiveId" clId="{21932302-0433-4F80-9189-3850379D6620}" dt="2025-04-19T18:57:59.819" v="416" actId="1076"/>
+      <pc:docMkLst>
+        <pc:docMk/>
+      </pc:docMkLst>
+      <pc:sldChg chg="modSp mod">
+        <pc:chgData name="Arthur Mbomo" userId="11b0b643726c3bc0" providerId="LiveId" clId="{21932302-0433-4F80-9189-3850379D6620}" dt="2025-04-19T18:57:59.819" v="416" actId="1076"/>
+        <pc:sldMkLst>
+          <pc:docMk/>
+          <pc:sldMk cId="0" sldId="261"/>
+        </pc:sldMkLst>
+        <pc:picChg chg="mod">
+          <ac:chgData name="Arthur Mbomo" userId="11b0b643726c3bc0" providerId="LiveId" clId="{21932302-0433-4F80-9189-3850379D6620}" dt="2025-04-19T18:57:59.819" v="416" actId="1076"/>
+          <ac:picMkLst>
+            <pc:docMk/>
+            <pc:sldMk cId="0" sldId="261"/>
+            <ac:picMk id="92" creationId="{00000000-0000-0000-0000-000000000000}"/>
+          </ac:picMkLst>
+        </pc:picChg>
+      </pc:sldChg>
+      <pc:sldChg chg="addSp delSp modSp add mod">
+        <pc:chgData name="Arthur Mbomo" userId="11b0b643726c3bc0" providerId="LiveId" clId="{21932302-0433-4F80-9189-3850379D6620}" dt="2025-04-19T18:43:20.195" v="412" actId="113"/>
+        <pc:sldMkLst>
+          <pc:docMk/>
+          <pc:sldMk cId="2210348277" sldId="275"/>
+        </pc:sldMkLst>
+        <pc:spChg chg="del mod">
+          <ac:chgData name="Arthur Mbomo" userId="11b0b643726c3bc0" providerId="LiveId" clId="{21932302-0433-4F80-9189-3850379D6620}" dt="2025-04-19T18:40:19.771" v="385" actId="478"/>
+          <ac:spMkLst>
+            <pc:docMk/>
+            <pc:sldMk cId="2210348277" sldId="275"/>
+            <ac:spMk id="2" creationId="{42E8C39F-D25A-3C61-B58C-4077E6C03DF8}"/>
+          </ac:spMkLst>
+        </pc:spChg>
+        <pc:spChg chg="add del mod">
+          <ac:chgData name="Arthur Mbomo" userId="11b0b643726c3bc0" providerId="LiveId" clId="{21932302-0433-4F80-9189-3850379D6620}" dt="2025-04-19T18:38:59.589" v="366" actId="478"/>
+          <ac:spMkLst>
+            <pc:docMk/>
+            <pc:sldMk cId="2210348277" sldId="275"/>
+            <ac:spMk id="4" creationId="{577E563E-9EFB-45B5-4AF1-3436ED7E7FC8}"/>
+          </ac:spMkLst>
+        </pc:spChg>
+        <pc:spChg chg="del mod">
+          <ac:chgData name="Arthur Mbomo" userId="11b0b643726c3bc0" providerId="LiveId" clId="{21932302-0433-4F80-9189-3850379D6620}" dt="2025-04-19T18:38:49.956" v="365" actId="478"/>
+          <ac:spMkLst>
+            <pc:docMk/>
+            <pc:sldMk cId="2210348277" sldId="275"/>
+            <ac:spMk id="54" creationId="{1A2D8D5A-1EAC-46C3-5B44-5294C0C66CE8}"/>
+          </ac:spMkLst>
+        </pc:spChg>
+        <pc:spChg chg="mod">
+          <ac:chgData name="Arthur Mbomo" userId="11b0b643726c3bc0" providerId="LiveId" clId="{21932302-0433-4F80-9189-3850379D6620}" dt="2025-04-19T18:43:20.195" v="412" actId="113"/>
+          <ac:spMkLst>
+            <pc:docMk/>
+            <pc:sldMk cId="2210348277" sldId="275"/>
+            <ac:spMk id="57" creationId="{FE5E8BE4-2BEA-D037-C931-D6B573A60147}"/>
+          </ac:spMkLst>
+        </pc:spChg>
+        <pc:picChg chg="mod">
+          <ac:chgData name="Arthur Mbomo" userId="11b0b643726c3bc0" providerId="LiveId" clId="{21932302-0433-4F80-9189-3850379D6620}" dt="2025-04-19T18:39:04.611" v="367" actId="1076"/>
+          <ac:picMkLst>
+            <pc:docMk/>
+            <pc:sldMk cId="2210348277" sldId="275"/>
+            <ac:picMk id="56" creationId="{0E52B20A-1521-0DD7-4D51-281F1633552B}"/>
+          </ac:picMkLst>
+        </pc:picChg>
+      </pc:sldChg>
+    </pc:docChg>
+  </pc:docChgLst>
+</pc:chgInfo>
 </file>
 
 <file path=ppt/diagrams/colors1.xml><?xml version="1.0" encoding="utf-8"?>
@@ -5040,6 +5117,128 @@
   <p:cSld>
     <p:spTree>
       <p:nvGrpSpPr>
+        <p:cNvPr id="1" name="Shape 143"/>
+        <p:cNvGrpSpPr/>
+        <p:nvPr/>
+      </p:nvGrpSpPr>
+      <p:grpSpPr>
+        <a:xfrm>
+          <a:off x="0" y="0"/>
+          <a:ext cx="0" cy="0"/>
+          <a:chOff x="0" y="0"/>
+          <a:chExt cx="0" cy="0"/>
+        </a:xfrm>
+      </p:grpSpPr>
+      <p:sp>
+        <p:nvSpPr>
+          <p:cNvPr id="144" name="Google Shape;144;p13:notes"/>
+          <p:cNvSpPr>
+            <a:spLocks noGrp="1" noRot="1" noChangeAspect="1"/>
+          </p:cNvSpPr>
+          <p:nvPr>
+            <p:ph type="sldImg" idx="2"/>
+          </p:nvPr>
+        </p:nvSpPr>
+        <p:spPr>
+          <a:xfrm>
+            <a:off x="381000" y="685800"/>
+            <a:ext cx="6096000" cy="3429000"/>
+          </a:xfrm>
+          <a:custGeom>
+            <a:avLst/>
+            <a:gdLst/>
+            <a:ahLst/>
+            <a:cxnLst/>
+            <a:rect l="l" t="t" r="r" b="b"/>
+            <a:pathLst>
+              <a:path w="120000" h="120000" extrusionOk="0">
+                <a:moveTo>
+                  <a:pt x="0" y="0"/>
+                </a:moveTo>
+                <a:lnTo>
+                  <a:pt x="120000" y="0"/>
+                </a:lnTo>
+                <a:lnTo>
+                  <a:pt x="120000" y="120000"/>
+                </a:lnTo>
+                <a:lnTo>
+                  <a:pt x="0" y="120000"/>
+                </a:lnTo>
+                <a:close/>
+              </a:path>
+            </a:pathLst>
+          </a:custGeom>
+          <a:noFill/>
+          <a:ln w="9525" cap="flat" cmpd="sng">
+            <a:solidFill>
+              <a:srgbClr val="000000"/>
+            </a:solidFill>
+            <a:prstDash val="solid"/>
+            <a:round/>
+            <a:headEnd type="none" w="sm" len="sm"/>
+            <a:tailEnd type="none" w="sm" len="sm"/>
+          </a:ln>
+        </p:spPr>
+      </p:sp>
+      <p:sp>
+        <p:nvSpPr>
+          <p:cNvPr id="145" name="Google Shape;145;p13:notes"/>
+          <p:cNvSpPr txBox="1">
+            <a:spLocks noGrp="1"/>
+          </p:cNvSpPr>
+          <p:nvPr>
+            <p:ph type="body" idx="1"/>
+          </p:nvPr>
+        </p:nvSpPr>
+        <p:spPr>
+          <a:xfrm>
+            <a:off x="685800" y="4343400"/>
+            <a:ext cx="5486400" cy="4114800"/>
+          </a:xfrm>
+          <a:prstGeom prst="rect">
+            <a:avLst/>
+          </a:prstGeom>
+          <a:noFill/>
+          <a:ln>
+            <a:noFill/>
+          </a:ln>
+        </p:spPr>
+        <p:txBody>
+          <a:bodyPr spcFirstLastPara="1" wrap="square" lIns="91425" tIns="91425" rIns="91425" bIns="91425" anchor="t" anchorCtr="0">
+            <a:noAutofit/>
+          </a:bodyPr>
+          <a:lstStyle/>
+          <a:p>
+            <a:pPr marL="0" lvl="0" indent="0" algn="l" rtl="0">
+              <a:lnSpc>
+                <a:spcPct val="100000"/>
+              </a:lnSpc>
+              <a:spcBef>
+                <a:spcPts val="0"/>
+              </a:spcBef>
+              <a:spcAft>
+                <a:spcPts val="0"/>
+              </a:spcAft>
+              <a:buSzPts val="1100"/>
+              <a:buNone/>
+            </a:pPr>
+            <a:endParaRPr/>
+          </a:p>
+        </p:txBody>
+      </p:sp>
+    </p:spTree>
+  </p:cSld>
+  <p:clrMapOvr>
+    <a:masterClrMapping/>
+  </p:clrMapOvr>
+</p:notes>
+</file>
+
+<file path=ppt/notesSlides/notesSlide11.xml><?xml version="1.0" encoding="utf-8"?>
+<p:notes xmlns:a="http://schemas.openxmlformats.org/drawingml/2006/main" xmlns:r="http://schemas.openxmlformats.org/officeDocument/2006/relationships" xmlns:p="http://schemas.openxmlformats.org/presentationml/2006/main" showMasterSp="0" showMasterPhAnim="0">
+  <p:cSld>
+    <p:spTree>
+      <p:nvGrpSpPr>
         <p:cNvPr id="1" name="Shape 167"/>
         <p:cNvGrpSpPr/>
         <p:nvPr/>
@@ -5158,6 +5357,151 @@
 </file>
 
 <file path=ppt/notesSlides/notesSlide2.xml><?xml version="1.0" encoding="utf-8"?>
+<p:notes xmlns:a="http://schemas.openxmlformats.org/drawingml/2006/main" xmlns:r="http://schemas.openxmlformats.org/officeDocument/2006/relationships" xmlns:p="http://schemas.openxmlformats.org/presentationml/2006/main" showMasterSp="0" showMasterPhAnim="0">
+  <p:cSld>
+    <p:spTree>
+      <p:nvGrpSpPr>
+        <p:cNvPr id="1" name="Shape 50">
+          <a:extLst>
+            <a:ext uri="{FF2B5EF4-FFF2-40B4-BE49-F238E27FC236}">
+              <a16:creationId xmlns:a16="http://schemas.microsoft.com/office/drawing/2014/main" id="{DA6D4D03-0180-89B3-18A2-BFA4687586BD}"/>
+            </a:ext>
+          </a:extLst>
+        </p:cNvPr>
+        <p:cNvGrpSpPr/>
+        <p:nvPr/>
+      </p:nvGrpSpPr>
+      <p:grpSpPr>
+        <a:xfrm>
+          <a:off x="0" y="0"/>
+          <a:ext cx="0" cy="0"/>
+          <a:chOff x="0" y="0"/>
+          <a:chExt cx="0" cy="0"/>
+        </a:xfrm>
+      </p:grpSpPr>
+      <p:sp>
+        <p:nvSpPr>
+          <p:cNvPr id="51" name="Google Shape;51;p1:notes">
+            <a:extLst>
+              <a:ext uri="{FF2B5EF4-FFF2-40B4-BE49-F238E27FC236}">
+                <a16:creationId xmlns:a16="http://schemas.microsoft.com/office/drawing/2014/main" id="{C64C8DFA-00ED-0F8D-716B-5FBDEE5E6BBF}"/>
+              </a:ext>
+            </a:extLst>
+          </p:cNvPr>
+          <p:cNvSpPr>
+            <a:spLocks noGrp="1" noRot="1" noChangeAspect="1"/>
+          </p:cNvSpPr>
+          <p:nvPr>
+            <p:ph type="sldImg" idx="2"/>
+          </p:nvPr>
+        </p:nvSpPr>
+        <p:spPr>
+          <a:xfrm>
+            <a:off x="381000" y="685800"/>
+            <a:ext cx="6096000" cy="3429000"/>
+          </a:xfrm>
+          <a:custGeom>
+            <a:avLst/>
+            <a:gdLst/>
+            <a:ahLst/>
+            <a:cxnLst/>
+            <a:rect l="l" t="t" r="r" b="b"/>
+            <a:pathLst>
+              <a:path w="120000" h="120000" extrusionOk="0">
+                <a:moveTo>
+                  <a:pt x="0" y="0"/>
+                </a:moveTo>
+                <a:lnTo>
+                  <a:pt x="120000" y="0"/>
+                </a:lnTo>
+                <a:lnTo>
+                  <a:pt x="120000" y="120000"/>
+                </a:lnTo>
+                <a:lnTo>
+                  <a:pt x="0" y="120000"/>
+                </a:lnTo>
+                <a:close/>
+              </a:path>
+            </a:pathLst>
+          </a:custGeom>
+          <a:noFill/>
+          <a:ln w="9525" cap="flat" cmpd="sng">
+            <a:solidFill>
+              <a:srgbClr val="000000"/>
+            </a:solidFill>
+            <a:prstDash val="solid"/>
+            <a:round/>
+            <a:headEnd type="none" w="sm" len="sm"/>
+            <a:tailEnd type="none" w="sm" len="sm"/>
+          </a:ln>
+        </p:spPr>
+      </p:sp>
+      <p:sp>
+        <p:nvSpPr>
+          <p:cNvPr id="52" name="Google Shape;52;p1:notes">
+            <a:extLst>
+              <a:ext uri="{FF2B5EF4-FFF2-40B4-BE49-F238E27FC236}">
+                <a16:creationId xmlns:a16="http://schemas.microsoft.com/office/drawing/2014/main" id="{64DFEE4E-9B3E-542B-3227-EE940CDAD1F6}"/>
+              </a:ext>
+            </a:extLst>
+          </p:cNvPr>
+          <p:cNvSpPr txBox="1">
+            <a:spLocks noGrp="1"/>
+          </p:cNvSpPr>
+          <p:nvPr>
+            <p:ph type="body" idx="1"/>
+          </p:nvPr>
+        </p:nvSpPr>
+        <p:spPr>
+          <a:xfrm>
+            <a:off x="685800" y="4343400"/>
+            <a:ext cx="5486400" cy="4114800"/>
+          </a:xfrm>
+          <a:prstGeom prst="rect">
+            <a:avLst/>
+          </a:prstGeom>
+          <a:noFill/>
+          <a:ln>
+            <a:noFill/>
+          </a:ln>
+        </p:spPr>
+        <p:txBody>
+          <a:bodyPr spcFirstLastPara="1" wrap="square" lIns="91425" tIns="91425" rIns="91425" bIns="91425" anchor="t" anchorCtr="0">
+            <a:noAutofit/>
+          </a:bodyPr>
+          <a:lstStyle/>
+          <a:p>
+            <a:pPr marL="0" lvl="0" indent="0" algn="l" rtl="0">
+              <a:lnSpc>
+                <a:spcPct val="100000"/>
+              </a:lnSpc>
+              <a:spcBef>
+                <a:spcPts val="0"/>
+              </a:spcBef>
+              <a:spcAft>
+                <a:spcPts val="0"/>
+              </a:spcAft>
+              <a:buSzPts val="1100"/>
+              <a:buNone/>
+            </a:pPr>
+            <a:endParaRPr/>
+          </a:p>
+        </p:txBody>
+      </p:sp>
+    </p:spTree>
+    <p:extLst>
+      <p:ext uri="{BB962C8B-B14F-4D97-AF65-F5344CB8AC3E}">
+        <p14:creationId xmlns:p14="http://schemas.microsoft.com/office/powerpoint/2010/main" val="3941169917"/>
+      </p:ext>
+    </p:extLst>
+  </p:cSld>
+  <p:clrMapOvr>
+    <a:masterClrMapping/>
+  </p:clrMapOvr>
+</p:notes>
+</file>
+
+<file path=ppt/notesSlides/notesSlide3.xml><?xml version="1.0" encoding="utf-8"?>
 <p:notes xmlns:a="http://schemas.openxmlformats.org/drawingml/2006/main" xmlns:r="http://schemas.openxmlformats.org/officeDocument/2006/relationships" xmlns:p="http://schemas.openxmlformats.org/presentationml/2006/main" showMasterSp="0" showMasterPhAnim="0">
   <p:cSld>
     <p:spTree>
@@ -5279,7 +5623,7 @@
 </p:notes>
 </file>
 
-<file path=ppt/notesSlides/notesSlide3.xml><?xml version="1.0" encoding="utf-8"?>
+<file path=ppt/notesSlides/notesSlide4.xml><?xml version="1.0" encoding="utf-8"?>
 <p:notes xmlns:a="http://schemas.openxmlformats.org/drawingml/2006/main" xmlns:r="http://schemas.openxmlformats.org/officeDocument/2006/relationships" xmlns:p="http://schemas.openxmlformats.org/presentationml/2006/main" showMasterSp="0" showMasterPhAnim="0">
   <p:cSld>
     <p:spTree>
@@ -5383,7 +5727,7 @@
 </p:notes>
 </file>
 
-<file path=ppt/notesSlides/notesSlide4.xml><?xml version="1.0" encoding="utf-8"?>
+<file path=ppt/notesSlides/notesSlide5.xml><?xml version="1.0" encoding="utf-8"?>
 <p:notes xmlns:a="http://schemas.openxmlformats.org/drawingml/2006/main" xmlns:r="http://schemas.openxmlformats.org/officeDocument/2006/relationships" xmlns:p="http://schemas.openxmlformats.org/presentationml/2006/main" showMasterSp="0" showMasterPhAnim="0">
   <p:cSld>
     <p:spTree>
@@ -5505,95 +5849,6 @@
 </p:notes>
 </file>
 
-<file path=ppt/notesSlides/notesSlide5.xml><?xml version="1.0" encoding="utf-8"?>
-<p:notes xmlns:a="http://schemas.openxmlformats.org/drawingml/2006/main" xmlns:r="http://schemas.openxmlformats.org/officeDocument/2006/relationships" xmlns:p="http://schemas.openxmlformats.org/presentationml/2006/main">
-  <p:cSld>
-    <p:spTree>
-      <p:nvGrpSpPr>
-        <p:cNvPr id="1" name=""/>
-        <p:cNvGrpSpPr/>
-        <p:nvPr/>
-      </p:nvGrpSpPr>
-      <p:grpSpPr>
-        <a:xfrm>
-          <a:off x="0" y="0"/>
-          <a:ext cx="0" cy="0"/>
-          <a:chOff x="0" y="0"/>
-          <a:chExt cx="0" cy="0"/>
-        </a:xfrm>
-      </p:grpSpPr>
-      <p:sp>
-        <p:nvSpPr>
-          <p:cNvPr id="2" name="Slide Image Placeholder 1"/>
-          <p:cNvSpPr>
-            <a:spLocks noGrp="1" noRot="1" noChangeAspect="1"/>
-          </p:cNvSpPr>
-          <p:nvPr>
-            <p:ph type="sldImg"/>
-          </p:nvPr>
-        </p:nvSpPr>
-        <p:spPr>
-          <a:xfrm>
-            <a:off x="381000" y="685800"/>
-            <a:ext cx="6096000" cy="3429000"/>
-          </a:xfrm>
-        </p:spPr>
-      </p:sp>
-      <p:sp>
-        <p:nvSpPr>
-          <p:cNvPr id="3" name="Notes Placeholder 2"/>
-          <p:cNvSpPr>
-            <a:spLocks noGrp="1"/>
-          </p:cNvSpPr>
-          <p:nvPr>
-            <p:ph type="body" idx="1"/>
-          </p:nvPr>
-        </p:nvSpPr>
-        <p:spPr/>
-        <p:txBody>
-          <a:bodyPr/>
-          <a:lstStyle/>
-          <a:p>
-            <a:endParaRPr lang="en-US" dirty="0"/>
-          </a:p>
-        </p:txBody>
-      </p:sp>
-      <p:sp>
-        <p:nvSpPr>
-          <p:cNvPr id="4" name="Slide Number Placeholder 3"/>
-          <p:cNvSpPr>
-            <a:spLocks noGrp="1"/>
-          </p:cNvSpPr>
-          <p:nvPr>
-            <p:ph type="sldNum" sz="quarter" idx="10"/>
-          </p:nvPr>
-        </p:nvSpPr>
-        <p:spPr/>
-        <p:txBody>
-          <a:bodyPr/>
-          <a:lstStyle/>
-          <a:p>
-            <a:fld id="{F7021451-1387-4CA6-816F-3879F97B5CBC}" type="slidenum">
-              <a:rPr lang="en-US"/>
-              <a:t>5</a:t>
-            </a:fld>
-            <a:endParaRPr lang="en-US"/>
-          </a:p>
-        </p:txBody>
-      </p:sp>
-    </p:spTree>
-    <p:extLst>
-      <p:ext uri="{BB962C8B-B14F-4D97-AF65-F5344CB8AC3E}">
-        <p14:creationId xmlns:p14="http://schemas.microsoft.com/office/powerpoint/2010/main" val="1024086991"/>
-      </p:ext>
-    </p:extLst>
-  </p:cSld>
-  <p:clrMapOvr>
-    <a:masterClrMapping/>
-  </p:clrMapOvr>
-</p:notes>
-</file>
-
 <file path=ppt/notesSlides/notesSlide6.xml><?xml version="1.0" encoding="utf-8"?>
 <p:notes xmlns:a="http://schemas.openxmlformats.org/drawingml/2006/main" xmlns:r="http://schemas.openxmlformats.org/officeDocument/2006/relationships" xmlns:p="http://schemas.openxmlformats.org/presentationml/2006/main">
   <p:cSld>
@@ -5684,6 +5939,95 @@
 </file>
 
 <file path=ppt/notesSlides/notesSlide7.xml><?xml version="1.0" encoding="utf-8"?>
+<p:notes xmlns:a="http://schemas.openxmlformats.org/drawingml/2006/main" xmlns:r="http://schemas.openxmlformats.org/officeDocument/2006/relationships" xmlns:p="http://schemas.openxmlformats.org/presentationml/2006/main">
+  <p:cSld>
+    <p:spTree>
+      <p:nvGrpSpPr>
+        <p:cNvPr id="1" name=""/>
+        <p:cNvGrpSpPr/>
+        <p:nvPr/>
+      </p:nvGrpSpPr>
+      <p:grpSpPr>
+        <a:xfrm>
+          <a:off x="0" y="0"/>
+          <a:ext cx="0" cy="0"/>
+          <a:chOff x="0" y="0"/>
+          <a:chExt cx="0" cy="0"/>
+        </a:xfrm>
+      </p:grpSpPr>
+      <p:sp>
+        <p:nvSpPr>
+          <p:cNvPr id="2" name="Slide Image Placeholder 1"/>
+          <p:cNvSpPr>
+            <a:spLocks noGrp="1" noRot="1" noChangeAspect="1"/>
+          </p:cNvSpPr>
+          <p:nvPr>
+            <p:ph type="sldImg"/>
+          </p:nvPr>
+        </p:nvSpPr>
+        <p:spPr>
+          <a:xfrm>
+            <a:off x="381000" y="685800"/>
+            <a:ext cx="6096000" cy="3429000"/>
+          </a:xfrm>
+        </p:spPr>
+      </p:sp>
+      <p:sp>
+        <p:nvSpPr>
+          <p:cNvPr id="3" name="Notes Placeholder 2"/>
+          <p:cNvSpPr>
+            <a:spLocks noGrp="1"/>
+          </p:cNvSpPr>
+          <p:nvPr>
+            <p:ph type="body" idx="1"/>
+          </p:nvPr>
+        </p:nvSpPr>
+        <p:spPr/>
+        <p:txBody>
+          <a:bodyPr/>
+          <a:lstStyle/>
+          <a:p>
+            <a:endParaRPr lang="en-US" dirty="0"/>
+          </a:p>
+        </p:txBody>
+      </p:sp>
+      <p:sp>
+        <p:nvSpPr>
+          <p:cNvPr id="4" name="Slide Number Placeholder 3"/>
+          <p:cNvSpPr>
+            <a:spLocks noGrp="1"/>
+          </p:cNvSpPr>
+          <p:nvPr>
+            <p:ph type="sldNum" sz="quarter" idx="10"/>
+          </p:nvPr>
+        </p:nvSpPr>
+        <p:spPr/>
+        <p:txBody>
+          <a:bodyPr/>
+          <a:lstStyle/>
+          <a:p>
+            <a:fld id="{F7021451-1387-4CA6-816F-3879F97B5CBC}" type="slidenum">
+              <a:rPr lang="en-US"/>
+              <a:t>7</a:t>
+            </a:fld>
+            <a:endParaRPr lang="en-US"/>
+          </a:p>
+        </p:txBody>
+      </p:sp>
+    </p:spTree>
+    <p:extLst>
+      <p:ext uri="{BB962C8B-B14F-4D97-AF65-F5344CB8AC3E}">
+        <p14:creationId xmlns:p14="http://schemas.microsoft.com/office/powerpoint/2010/main" val="1024086991"/>
+      </p:ext>
+    </p:extLst>
+  </p:cSld>
+  <p:clrMapOvr>
+    <a:masterClrMapping/>
+  </p:clrMapOvr>
+</p:notes>
+</file>
+
+<file path=ppt/notesSlides/notesSlide8.xml><?xml version="1.0" encoding="utf-8"?>
 <p:notes xmlns:a="http://schemas.openxmlformats.org/drawingml/2006/main" xmlns:r="http://schemas.openxmlformats.org/officeDocument/2006/relationships" xmlns:p="http://schemas.openxmlformats.org/presentationml/2006/main" showMasterSp="0" showMasterPhAnim="0">
   <p:cSld>
     <p:spTree>
@@ -5805,7 +6149,7 @@
 </p:notes>
 </file>
 
-<file path=ppt/notesSlides/notesSlide8.xml><?xml version="1.0" encoding="utf-8"?>
+<file path=ppt/notesSlides/notesSlide9.xml><?xml version="1.0" encoding="utf-8"?>
 <p:notes xmlns:a="http://schemas.openxmlformats.org/drawingml/2006/main" xmlns:r="http://schemas.openxmlformats.org/officeDocument/2006/relationships" xmlns:p="http://schemas.openxmlformats.org/presentationml/2006/main" showMasterSp="0" showMasterPhAnim="0">
   <p:cSld>
     <p:spTree>
@@ -5876,128 +6220,6 @@
       <p:sp>
         <p:nvSpPr>
           <p:cNvPr id="131" name="Google Shape;131;p11:notes"/>
-          <p:cNvSpPr txBox="1">
-            <a:spLocks noGrp="1"/>
-          </p:cNvSpPr>
-          <p:nvPr>
-            <p:ph type="body" idx="1"/>
-          </p:nvPr>
-        </p:nvSpPr>
-        <p:spPr>
-          <a:xfrm>
-            <a:off x="685800" y="4343400"/>
-            <a:ext cx="5486400" cy="4114800"/>
-          </a:xfrm>
-          <a:prstGeom prst="rect">
-            <a:avLst/>
-          </a:prstGeom>
-          <a:noFill/>
-          <a:ln>
-            <a:noFill/>
-          </a:ln>
-        </p:spPr>
-        <p:txBody>
-          <a:bodyPr spcFirstLastPara="1" wrap="square" lIns="91425" tIns="91425" rIns="91425" bIns="91425" anchor="t" anchorCtr="0">
-            <a:noAutofit/>
-          </a:bodyPr>
-          <a:lstStyle/>
-          <a:p>
-            <a:pPr marL="0" lvl="0" indent="0" algn="l" rtl="0">
-              <a:lnSpc>
-                <a:spcPct val="100000"/>
-              </a:lnSpc>
-              <a:spcBef>
-                <a:spcPts val="0"/>
-              </a:spcBef>
-              <a:spcAft>
-                <a:spcPts val="0"/>
-              </a:spcAft>
-              <a:buSzPts val="1100"/>
-              <a:buNone/>
-            </a:pPr>
-            <a:endParaRPr/>
-          </a:p>
-        </p:txBody>
-      </p:sp>
-    </p:spTree>
-  </p:cSld>
-  <p:clrMapOvr>
-    <a:masterClrMapping/>
-  </p:clrMapOvr>
-</p:notes>
-</file>
-
-<file path=ppt/notesSlides/notesSlide9.xml><?xml version="1.0" encoding="utf-8"?>
-<p:notes xmlns:a="http://schemas.openxmlformats.org/drawingml/2006/main" xmlns:r="http://schemas.openxmlformats.org/officeDocument/2006/relationships" xmlns:p="http://schemas.openxmlformats.org/presentationml/2006/main" showMasterSp="0" showMasterPhAnim="0">
-  <p:cSld>
-    <p:spTree>
-      <p:nvGrpSpPr>
-        <p:cNvPr id="1" name="Shape 143"/>
-        <p:cNvGrpSpPr/>
-        <p:nvPr/>
-      </p:nvGrpSpPr>
-      <p:grpSpPr>
-        <a:xfrm>
-          <a:off x="0" y="0"/>
-          <a:ext cx="0" cy="0"/>
-          <a:chOff x="0" y="0"/>
-          <a:chExt cx="0" cy="0"/>
-        </a:xfrm>
-      </p:grpSpPr>
-      <p:sp>
-        <p:nvSpPr>
-          <p:cNvPr id="144" name="Google Shape;144;p13:notes"/>
-          <p:cNvSpPr>
-            <a:spLocks noGrp="1" noRot="1" noChangeAspect="1"/>
-          </p:cNvSpPr>
-          <p:nvPr>
-            <p:ph type="sldImg" idx="2"/>
-          </p:nvPr>
-        </p:nvSpPr>
-        <p:spPr>
-          <a:xfrm>
-            <a:off x="381000" y="685800"/>
-            <a:ext cx="6096000" cy="3429000"/>
-          </a:xfrm>
-          <a:custGeom>
-            <a:avLst/>
-            <a:gdLst/>
-            <a:ahLst/>
-            <a:cxnLst/>
-            <a:rect l="l" t="t" r="r" b="b"/>
-            <a:pathLst>
-              <a:path w="120000" h="120000" extrusionOk="0">
-                <a:moveTo>
-                  <a:pt x="0" y="0"/>
-                </a:moveTo>
-                <a:lnTo>
-                  <a:pt x="120000" y="0"/>
-                </a:lnTo>
-                <a:lnTo>
-                  <a:pt x="120000" y="120000"/>
-                </a:lnTo>
-                <a:lnTo>
-                  <a:pt x="0" y="120000"/>
-                </a:lnTo>
-                <a:close/>
-              </a:path>
-            </a:pathLst>
-          </a:custGeom>
-          <a:noFill/>
-          <a:ln w="9525" cap="flat" cmpd="sng">
-            <a:solidFill>
-              <a:srgbClr val="000000"/>
-            </a:solidFill>
-            <a:prstDash val="solid"/>
-            <a:round/>
-            <a:headEnd type="none" w="sm" len="sm"/>
-            <a:tailEnd type="none" w="sm" len="sm"/>
-          </a:ln>
-        </p:spPr>
-      </p:sp>
-      <p:sp>
-        <p:nvSpPr>
-          <p:cNvPr id="145" name="Google Shape;145;p13:notes"/>
           <p:cNvSpPr txBox="1">
             <a:spLocks noGrp="1"/>
           </p:cNvSpPr>
@@ -14447,6 +14669,218 @@
 <file path=ppt/slides/slide10.xml><?xml version="1.0" encoding="utf-8"?>
 <p:sld xmlns:a="http://schemas.openxmlformats.org/drawingml/2006/main" xmlns:r="http://schemas.openxmlformats.org/officeDocument/2006/relationships" xmlns:p="http://schemas.openxmlformats.org/presentationml/2006/main">
   <p:cSld>
+    <p:spTree>
+      <p:nvGrpSpPr>
+        <p:cNvPr id="1" name="Shape 146"/>
+        <p:cNvGrpSpPr/>
+        <p:nvPr/>
+      </p:nvGrpSpPr>
+      <p:grpSpPr>
+        <a:xfrm>
+          <a:off x="0" y="0"/>
+          <a:ext cx="0" cy="0"/>
+          <a:chOff x="0" y="0"/>
+          <a:chExt cx="0" cy="0"/>
+        </a:xfrm>
+      </p:grpSpPr>
+      <p:sp>
+        <p:nvSpPr>
+          <p:cNvPr id="147" name="Google Shape;147;p13"/>
+          <p:cNvSpPr txBox="1">
+            <a:spLocks noGrp="1"/>
+          </p:cNvSpPr>
+          <p:nvPr>
+            <p:ph type="ctrTitle" idx="4294967295"/>
+          </p:nvPr>
+        </p:nvSpPr>
+        <p:spPr>
+          <a:xfrm>
+            <a:off x="1192664" y="403309"/>
+            <a:ext cx="5315100" cy="533100"/>
+          </a:xfrm>
+          <a:prstGeom prst="rect">
+            <a:avLst/>
+          </a:prstGeom>
+          <a:noFill/>
+          <a:ln>
+            <a:noFill/>
+          </a:ln>
+        </p:spPr>
+        <p:txBody>
+          <a:bodyPr spcFirstLastPara="1" wrap="square" lIns="91425" tIns="91425" rIns="91425" bIns="91425" anchor="t" anchorCtr="0">
+            <a:noAutofit/>
+          </a:bodyPr>
+          <a:lstStyle/>
+          <a:p>
+            <a:pPr marL="0" marR="0" lvl="0" indent="0" algn="l" rtl="0">
+              <a:lnSpc>
+                <a:spcPct val="100000"/>
+              </a:lnSpc>
+              <a:spcBef>
+                <a:spcPts val="0"/>
+              </a:spcBef>
+              <a:spcAft>
+                <a:spcPts val="0"/>
+              </a:spcAft>
+              <a:buClr>
+                <a:schemeClr val="dk1"/>
+              </a:buClr>
+              <a:buSzPts val="2800"/>
+              <a:buFont typeface="Arial"/>
+              <a:buNone/>
+            </a:pPr>
+            <a:r>
+              <a:rPr lang="en-GB" sz="2500" dirty="0">
+                <a:solidFill>
+                  <a:srgbClr val="0E3449"/>
+                </a:solidFill>
+                <a:latin typeface="Inter SemiBold"/>
+                <a:ea typeface="Inter SemiBold"/>
+                <a:cs typeface="Inter SemiBold"/>
+                <a:sym typeface="Inter SemiBold"/>
+              </a:rPr>
+              <a:t>4</a:t>
+            </a:r>
+            <a:r>
+              <a:rPr lang="en-GB" sz="2500" b="0" i="0" u="none" strike="noStrike" cap="none" dirty="0">
+                <a:solidFill>
+                  <a:srgbClr val="0E3449"/>
+                </a:solidFill>
+                <a:latin typeface="Inter SemiBold"/>
+                <a:ea typeface="Inter SemiBold"/>
+                <a:cs typeface="Inter SemiBold"/>
+                <a:sym typeface="Inter SemiBold"/>
+              </a:rPr>
+              <a:t>. Next Steps</a:t>
+            </a:r>
+            <a:endParaRPr dirty="0"/>
+          </a:p>
+        </p:txBody>
+      </p:sp>
+      <p:pic>
+        <p:nvPicPr>
+          <p:cNvPr id="148" name="Google Shape;148;p13"/>
+          <p:cNvPicPr preferRelativeResize="0"/>
+          <p:nvPr/>
+        </p:nvPicPr>
+        <p:blipFill rotWithShape="1">
+          <a:blip r:embed="rId3">
+            <a:alphaModFix/>
+          </a:blip>
+          <a:srcRect/>
+          <a:stretch/>
+        </p:blipFill>
+        <p:spPr>
+          <a:xfrm>
+            <a:off x="463375" y="482852"/>
+            <a:ext cx="576900" cy="385904"/>
+          </a:xfrm>
+          <a:prstGeom prst="rect">
+            <a:avLst/>
+          </a:prstGeom>
+          <a:noFill/>
+          <a:ln>
+            <a:noFill/>
+          </a:ln>
+        </p:spPr>
+      </p:pic>
+      <p:sp>
+        <p:nvSpPr>
+          <p:cNvPr id="149" name="Google Shape;149;p13"/>
+          <p:cNvSpPr/>
+          <p:nvPr/>
+        </p:nvSpPr>
+        <p:spPr>
+          <a:xfrm>
+            <a:off x="10225" y="4892025"/>
+            <a:ext cx="9144000" cy="251400"/>
+          </a:xfrm>
+          <a:prstGeom prst="rect">
+            <a:avLst/>
+          </a:prstGeom>
+          <a:solidFill>
+            <a:srgbClr val="C3FFFC"/>
+          </a:solidFill>
+          <a:ln>
+            <a:noFill/>
+          </a:ln>
+        </p:spPr>
+        <p:txBody>
+          <a:bodyPr spcFirstLastPara="1" wrap="square" lIns="91425" tIns="91425" rIns="91425" bIns="91425" anchor="ctr" anchorCtr="0">
+            <a:noAutofit/>
+          </a:bodyPr>
+          <a:lstStyle/>
+          <a:p>
+            <a:pPr marL="0" marR="0" lvl="0" indent="0" algn="l" rtl="0">
+              <a:lnSpc>
+                <a:spcPct val="100000"/>
+              </a:lnSpc>
+              <a:spcBef>
+                <a:spcPts val="0"/>
+              </a:spcBef>
+              <a:spcAft>
+                <a:spcPts val="0"/>
+              </a:spcAft>
+              <a:buClr>
+                <a:srgbClr val="000000"/>
+              </a:buClr>
+              <a:buSzPts val="1400"/>
+              <a:buFont typeface="Arial"/>
+              <a:buNone/>
+            </a:pPr>
+            <a:endParaRPr sz="1400" b="0" i="0" u="none" strike="noStrike" cap="none">
+              <a:solidFill>
+                <a:srgbClr val="000000"/>
+              </a:solidFill>
+              <a:latin typeface="Arial"/>
+              <a:ea typeface="Arial"/>
+              <a:cs typeface="Arial"/>
+              <a:sym typeface="Arial"/>
+            </a:endParaRPr>
+          </a:p>
+        </p:txBody>
+      </p:sp>
+      <p:pic>
+        <p:nvPicPr>
+          <p:cNvPr id="5" name="Image 4">
+            <a:extLst>
+              <a:ext uri="{FF2B5EF4-FFF2-40B4-BE49-F238E27FC236}">
+                <a16:creationId xmlns:a16="http://schemas.microsoft.com/office/drawing/2014/main" id="{42187B91-F87A-D2BB-1390-9CCCDD7745C4}"/>
+              </a:ext>
+            </a:extLst>
+          </p:cNvPr>
+          <p:cNvPicPr>
+            <a:picLocks noChangeAspect="1"/>
+          </p:cNvPicPr>
+          <p:nvPr/>
+        </p:nvPicPr>
+        <p:blipFill>
+          <a:blip r:embed="rId4"/>
+          <a:stretch>
+            <a:fillRect/>
+          </a:stretch>
+        </p:blipFill>
+        <p:spPr>
+          <a:xfrm>
+            <a:off x="823993" y="1195754"/>
+            <a:ext cx="7910622" cy="3270738"/>
+          </a:xfrm>
+          <a:prstGeom prst="rect">
+            <a:avLst/>
+          </a:prstGeom>
+        </p:spPr>
+      </p:pic>
+    </p:spTree>
+  </p:cSld>
+  <p:clrMapOvr>
+    <a:masterClrMapping/>
+  </p:clrMapOvr>
+</p:sld>
+</file>
+
+<file path=ppt/slides/slide11.xml><?xml version="1.0" encoding="utf-8"?>
+<p:sld xmlns:a="http://schemas.openxmlformats.org/drawingml/2006/main" xmlns:r="http://schemas.openxmlformats.org/officeDocument/2006/relationships" xmlns:p="http://schemas.openxmlformats.org/presentationml/2006/main">
+  <p:cSld>
     <p:bg>
       <p:bgPr>
         <a:solidFill>
@@ -14674,6 +15108,539 @@
 <file path=ppt/slides/slide2.xml><?xml version="1.0" encoding="utf-8"?>
 <p:sld xmlns:a="http://schemas.openxmlformats.org/drawingml/2006/main" xmlns:r="http://schemas.openxmlformats.org/officeDocument/2006/relationships" xmlns:p="http://schemas.openxmlformats.org/presentationml/2006/main">
   <p:cSld>
+    <p:bg>
+      <p:bgPr>
+        <a:solidFill>
+          <a:srgbClr val="3FDAD2"/>
+        </a:solidFill>
+        <a:effectLst/>
+      </p:bgPr>
+    </p:bg>
+    <p:spTree>
+      <p:nvGrpSpPr>
+        <p:cNvPr id="1" name="Shape 53">
+          <a:extLst>
+            <a:ext uri="{FF2B5EF4-FFF2-40B4-BE49-F238E27FC236}">
+              <a16:creationId xmlns:a16="http://schemas.microsoft.com/office/drawing/2014/main" id="{5DA1283B-5CDB-A1F9-9B71-F19E1DDE836B}"/>
+            </a:ext>
+          </a:extLst>
+        </p:cNvPr>
+        <p:cNvGrpSpPr/>
+        <p:nvPr/>
+      </p:nvGrpSpPr>
+      <p:grpSpPr>
+        <a:xfrm>
+          <a:off x="0" y="0"/>
+          <a:ext cx="0" cy="0"/>
+          <a:chOff x="0" y="0"/>
+          <a:chExt cx="0" cy="0"/>
+        </a:xfrm>
+      </p:grpSpPr>
+      <p:pic>
+        <p:nvPicPr>
+          <p:cNvPr id="55" name="Google Shape;55;p1">
+            <a:extLst>
+              <a:ext uri="{FF2B5EF4-FFF2-40B4-BE49-F238E27FC236}">
+                <a16:creationId xmlns:a16="http://schemas.microsoft.com/office/drawing/2014/main" id="{964E4811-FDBD-38E0-B662-16DCA751D2A0}"/>
+              </a:ext>
+            </a:extLst>
+          </p:cNvPr>
+          <p:cNvPicPr preferRelativeResize="0"/>
+          <p:nvPr/>
+        </p:nvPicPr>
+        <p:blipFill rotWithShape="1">
+          <a:blip r:embed="rId3">
+            <a:alphaModFix/>
+          </a:blip>
+          <a:srcRect/>
+          <a:stretch/>
+        </p:blipFill>
+        <p:spPr>
+          <a:xfrm>
+            <a:off x="4685550" y="2595750"/>
+            <a:ext cx="3818450" cy="2547749"/>
+          </a:xfrm>
+          <a:prstGeom prst="rect">
+            <a:avLst/>
+          </a:prstGeom>
+          <a:noFill/>
+          <a:ln>
+            <a:noFill/>
+          </a:ln>
+        </p:spPr>
+      </p:pic>
+      <p:pic>
+        <p:nvPicPr>
+          <p:cNvPr id="56" name="Google Shape;56;p1">
+            <a:extLst>
+              <a:ext uri="{FF2B5EF4-FFF2-40B4-BE49-F238E27FC236}">
+                <a16:creationId xmlns:a16="http://schemas.microsoft.com/office/drawing/2014/main" id="{0E52B20A-1521-0DD7-4D51-281F1633552B}"/>
+              </a:ext>
+            </a:extLst>
+          </p:cNvPr>
+          <p:cNvPicPr preferRelativeResize="0"/>
+          <p:nvPr/>
+        </p:nvPicPr>
+        <p:blipFill rotWithShape="1">
+          <a:blip r:embed="rId4">
+            <a:alphaModFix/>
+          </a:blip>
+          <a:srcRect/>
+          <a:stretch/>
+        </p:blipFill>
+        <p:spPr>
+          <a:xfrm>
+            <a:off x="308922" y="261063"/>
+            <a:ext cx="973275" cy="651050"/>
+          </a:xfrm>
+          <a:prstGeom prst="rect">
+            <a:avLst/>
+          </a:prstGeom>
+          <a:noFill/>
+          <a:ln>
+            <a:noFill/>
+          </a:ln>
+        </p:spPr>
+      </p:pic>
+      <p:sp>
+        <p:nvSpPr>
+          <p:cNvPr id="57" name="Google Shape;57;p1">
+            <a:extLst>
+              <a:ext uri="{FF2B5EF4-FFF2-40B4-BE49-F238E27FC236}">
+                <a16:creationId xmlns:a16="http://schemas.microsoft.com/office/drawing/2014/main" id="{FE5E8BE4-2BEA-D037-C931-D6B573A60147}"/>
+              </a:ext>
+            </a:extLst>
+          </p:cNvPr>
+          <p:cNvSpPr txBox="1">
+            <a:spLocks noGrp="1"/>
+          </p:cNvSpPr>
+          <p:nvPr>
+            <p:ph type="ctrTitle"/>
+          </p:nvPr>
+        </p:nvSpPr>
+        <p:spPr>
+          <a:xfrm>
+            <a:off x="1033176" y="4089575"/>
+            <a:ext cx="7470824" cy="533100"/>
+          </a:xfrm>
+          <a:prstGeom prst="rect">
+            <a:avLst/>
+          </a:prstGeom>
+          <a:noFill/>
+          <a:ln>
+            <a:noFill/>
+          </a:ln>
+        </p:spPr>
+        <p:txBody>
+          <a:bodyPr spcFirstLastPara="1" wrap="square" lIns="91425" tIns="91425" rIns="91425" bIns="91425" anchor="b" anchorCtr="0">
+            <a:noAutofit/>
+          </a:bodyPr>
+          <a:lstStyle/>
+          <a:p>
+            <a:pPr marL="0" lvl="0" indent="0" algn="l" rtl="0">
+              <a:lnSpc>
+                <a:spcPct val="100000"/>
+              </a:lnSpc>
+              <a:spcBef>
+                <a:spcPts val="0"/>
+              </a:spcBef>
+              <a:spcAft>
+                <a:spcPts val="0"/>
+              </a:spcAft>
+              <a:buSzPts val="5200"/>
+              <a:buNone/>
+            </a:pPr>
+            <a:r>
+              <a:rPr lang="fr-FR" sz="2000" b="1" dirty="0" err="1">
+                <a:solidFill>
+                  <a:schemeClr val="bg1"/>
+                </a:solidFill>
+                <a:latin typeface="Inter" panose="020B0604020202020204" charset="0"/>
+                <a:ea typeface="Inter" panose="020B0604020202020204" charset="0"/>
+              </a:rPr>
+              <a:t>Summary</a:t>
+            </a:r>
+            <a:br>
+              <a:rPr lang="fr-FR" sz="1600" b="1" dirty="0">
+                <a:solidFill>
+                  <a:schemeClr val="bg1"/>
+                </a:solidFill>
+                <a:latin typeface="Inter" panose="020B0604020202020204" charset="0"/>
+                <a:ea typeface="Inter" panose="020B0604020202020204" charset="0"/>
+              </a:rPr>
+            </a:br>
+            <a:br>
+              <a:rPr lang="fr-FR" sz="1600" b="1" dirty="0">
+                <a:solidFill>
+                  <a:schemeClr val="bg1"/>
+                </a:solidFill>
+                <a:latin typeface="Inter" panose="020B0604020202020204" charset="0"/>
+                <a:ea typeface="Inter" panose="020B0604020202020204" charset="0"/>
+              </a:rPr>
+            </a:br>
+            <a:r>
+              <a:rPr lang="fr-FR" sz="1600" b="1" dirty="0">
+                <a:solidFill>
+                  <a:schemeClr val="bg1"/>
+                </a:solidFill>
+                <a:latin typeface="Inter" panose="020B0604020202020204" charset="0"/>
+                <a:ea typeface="Inter" panose="020B0604020202020204" charset="0"/>
+              </a:rPr>
+              <a:t>1- </a:t>
+            </a:r>
+            <a:r>
+              <a:rPr lang="fr-FR" sz="1600" b="1" dirty="0" err="1">
+                <a:solidFill>
+                  <a:schemeClr val="bg1"/>
+                </a:solidFill>
+                <a:latin typeface="Inter" panose="020B0604020202020204" charset="0"/>
+                <a:ea typeface="Inter" panose="020B0604020202020204" charset="0"/>
+              </a:rPr>
+              <a:t>Current</a:t>
+            </a:r>
+            <a:r>
+              <a:rPr lang="fr-FR" sz="1600" b="1" dirty="0">
+                <a:solidFill>
+                  <a:schemeClr val="bg1"/>
+                </a:solidFill>
+                <a:latin typeface="Inter" panose="020B0604020202020204" charset="0"/>
+                <a:ea typeface="Inter" panose="020B0604020202020204" charset="0"/>
+              </a:rPr>
+              <a:t> state </a:t>
+            </a:r>
+            <a:r>
+              <a:rPr lang="fr-FR" sz="1600" b="1" dirty="0" err="1">
+                <a:solidFill>
+                  <a:schemeClr val="bg1"/>
+                </a:solidFill>
+                <a:latin typeface="Inter" panose="020B0604020202020204" charset="0"/>
+                <a:ea typeface="Inter" panose="020B0604020202020204" charset="0"/>
+              </a:rPr>
+              <a:t>overvieuw</a:t>
+            </a:r>
+            <a:br>
+              <a:rPr lang="fr-FR" sz="1600" b="1" dirty="0">
+                <a:solidFill>
+                  <a:schemeClr val="bg1"/>
+                </a:solidFill>
+                <a:latin typeface="Inter" panose="020B0604020202020204" charset="0"/>
+                <a:ea typeface="Inter" panose="020B0604020202020204" charset="0"/>
+              </a:rPr>
+            </a:br>
+            <a:br>
+              <a:rPr lang="fr-FR" sz="1600" b="1" dirty="0">
+                <a:solidFill>
+                  <a:schemeClr val="bg1"/>
+                </a:solidFill>
+                <a:latin typeface="Inter" panose="020B0604020202020204" charset="0"/>
+                <a:ea typeface="Inter" panose="020B0604020202020204" charset="0"/>
+              </a:rPr>
+            </a:br>
+            <a:r>
+              <a:rPr lang="fr-FR" sz="1600" dirty="0">
+                <a:solidFill>
+                  <a:schemeClr val="bg1"/>
+                </a:solidFill>
+                <a:latin typeface="Inter" panose="020B0604020202020204" charset="0"/>
+                <a:ea typeface="Inter" panose="020B0604020202020204" charset="0"/>
+              </a:rPr>
+              <a:t>Data </a:t>
+            </a:r>
+            <a:r>
+              <a:rPr lang="fr-FR" sz="1600" dirty="0" err="1">
+                <a:solidFill>
+                  <a:schemeClr val="bg1"/>
+                </a:solidFill>
+                <a:latin typeface="Inter" panose="020B0604020202020204" charset="0"/>
+                <a:ea typeface="Inter" panose="020B0604020202020204" charset="0"/>
+              </a:rPr>
+              <a:t>governance</a:t>
+            </a:r>
+            <a:r>
+              <a:rPr lang="fr-FR" sz="1600" dirty="0">
+                <a:solidFill>
+                  <a:schemeClr val="bg1"/>
+                </a:solidFill>
+                <a:latin typeface="Inter" panose="020B0604020202020204" charset="0"/>
+                <a:ea typeface="Inter" panose="020B0604020202020204" charset="0"/>
+              </a:rPr>
+              <a:t> </a:t>
+            </a:r>
+            <a:r>
+              <a:rPr lang="fr-FR" sz="1600" dirty="0" err="1">
+                <a:solidFill>
+                  <a:schemeClr val="bg1"/>
+                </a:solidFill>
+                <a:latin typeface="Inter" panose="020B0604020202020204" charset="0"/>
+                <a:ea typeface="Inter" panose="020B0604020202020204" charset="0"/>
+              </a:rPr>
+              <a:t>Maturity</a:t>
+            </a:r>
+            <a:r>
+              <a:rPr lang="fr-FR" sz="1600" dirty="0">
+                <a:solidFill>
+                  <a:schemeClr val="bg1"/>
+                </a:solidFill>
+                <a:latin typeface="Inter" panose="020B0604020202020204" charset="0"/>
+                <a:ea typeface="Inter" panose="020B0604020202020204" charset="0"/>
+              </a:rPr>
+              <a:t> </a:t>
+            </a:r>
+            <a:r>
+              <a:rPr lang="fr-FR" sz="1600" dirty="0" err="1">
+                <a:solidFill>
+                  <a:schemeClr val="bg1"/>
+                </a:solidFill>
+                <a:latin typeface="Inter" panose="020B0604020202020204" charset="0"/>
+                <a:ea typeface="Inter" panose="020B0604020202020204" charset="0"/>
+              </a:rPr>
+              <a:t>analysis</a:t>
+            </a:r>
+            <a:r>
+              <a:rPr lang="fr-FR" sz="1600" dirty="0">
+                <a:solidFill>
+                  <a:schemeClr val="bg1"/>
+                </a:solidFill>
+                <a:latin typeface="Inter" panose="020B0604020202020204" charset="0"/>
+                <a:ea typeface="Inter" panose="020B0604020202020204" charset="0"/>
+              </a:rPr>
+              <a:t> </a:t>
+            </a:r>
+            <a:br>
+              <a:rPr lang="fr-FR" sz="1600" dirty="0">
+                <a:solidFill>
+                  <a:schemeClr val="bg1"/>
+                </a:solidFill>
+                <a:latin typeface="Inter" panose="020B0604020202020204" charset="0"/>
+                <a:ea typeface="Inter" panose="020B0604020202020204" charset="0"/>
+              </a:rPr>
+            </a:br>
+            <a:r>
+              <a:rPr lang="en-US" sz="1600" dirty="0">
+                <a:solidFill>
+                  <a:schemeClr val="bg1"/>
+                </a:solidFill>
+                <a:latin typeface="Inter" panose="020B0604020202020204" charset="0"/>
+                <a:ea typeface="Inter" panose="020B0604020202020204" charset="0"/>
+              </a:rPr>
+              <a:t>Major challenges of Data Governance at Spotify</a:t>
+            </a:r>
+            <a:br>
+              <a:rPr lang="en-US" sz="1600" dirty="0">
+                <a:solidFill>
+                  <a:schemeClr val="bg1"/>
+                </a:solidFill>
+                <a:latin typeface="Inter" panose="020B0604020202020204" charset="0"/>
+                <a:ea typeface="Inter" panose="020B0604020202020204" charset="0"/>
+              </a:rPr>
+            </a:br>
+            <a:br>
+              <a:rPr lang="en-US" sz="1600" b="1" dirty="0">
+                <a:solidFill>
+                  <a:schemeClr val="bg1"/>
+                </a:solidFill>
+                <a:latin typeface="Inter" panose="020B0604020202020204" charset="0"/>
+                <a:ea typeface="Inter" panose="020B0604020202020204" charset="0"/>
+              </a:rPr>
+            </a:br>
+            <a:r>
+              <a:rPr lang="en-US" sz="1600" b="1" dirty="0">
+                <a:solidFill>
+                  <a:schemeClr val="bg1"/>
+                </a:solidFill>
+                <a:latin typeface="Inter" panose="020B0604020202020204" charset="0"/>
+                <a:ea typeface="Inter" panose="020B0604020202020204" charset="0"/>
+              </a:rPr>
+              <a:t>2-Data governance framework </a:t>
+            </a:r>
+            <a:br>
+              <a:rPr lang="en-US" sz="1600" dirty="0">
+                <a:solidFill>
+                  <a:schemeClr val="bg1"/>
+                </a:solidFill>
+                <a:latin typeface="Inter" panose="020B0604020202020204" charset="0"/>
+                <a:ea typeface="Inter" panose="020B0604020202020204" charset="0"/>
+              </a:rPr>
+            </a:br>
+            <a:br>
+              <a:rPr lang="en-US" sz="1600" dirty="0">
+                <a:solidFill>
+                  <a:schemeClr val="bg1"/>
+                </a:solidFill>
+                <a:latin typeface="Inter" panose="020B0604020202020204" charset="0"/>
+                <a:ea typeface="Inter" panose="020B0604020202020204" charset="0"/>
+              </a:rPr>
+            </a:br>
+            <a:r>
+              <a:rPr lang="en-US" sz="1600" dirty="0" err="1">
+                <a:solidFill>
+                  <a:schemeClr val="bg1"/>
+                </a:solidFill>
+                <a:latin typeface="Inter" panose="020B0604020202020204" charset="0"/>
+                <a:ea typeface="Inter" panose="020B0604020202020204" charset="0"/>
+              </a:rPr>
+              <a:t>Organisational</a:t>
+            </a:r>
+            <a:r>
+              <a:rPr lang="en-US" sz="1600" dirty="0">
+                <a:solidFill>
+                  <a:schemeClr val="bg1"/>
+                </a:solidFill>
+                <a:latin typeface="Inter" panose="020B0604020202020204" charset="0"/>
+                <a:ea typeface="Inter" panose="020B0604020202020204" charset="0"/>
+              </a:rPr>
+              <a:t> chart </a:t>
+            </a:r>
+            <a:br>
+              <a:rPr lang="en-US" sz="1600" dirty="0">
+                <a:solidFill>
+                  <a:schemeClr val="bg1"/>
+                </a:solidFill>
+                <a:latin typeface="Inter" panose="020B0604020202020204" charset="0"/>
+                <a:ea typeface="Inter" panose="020B0604020202020204" charset="0"/>
+              </a:rPr>
+            </a:br>
+            <a:r>
+              <a:rPr lang="en-US" sz="1600" dirty="0">
+                <a:solidFill>
+                  <a:schemeClr val="bg1"/>
+                </a:solidFill>
+                <a:latin typeface="Inter" panose="020B0604020202020204" charset="0"/>
+                <a:ea typeface="Inter" panose="020B0604020202020204" charset="0"/>
+              </a:rPr>
+              <a:t>Data </a:t>
+            </a:r>
+            <a:r>
+              <a:rPr lang="en-US" sz="1600" dirty="0" err="1">
+                <a:solidFill>
+                  <a:schemeClr val="bg1"/>
+                </a:solidFill>
+                <a:latin typeface="Inter" panose="020B0604020202020204" charset="0"/>
+                <a:ea typeface="Inter" panose="020B0604020202020204" charset="0"/>
+              </a:rPr>
+              <a:t>criticity</a:t>
+            </a:r>
+            <a:r>
+              <a:rPr lang="en-US" sz="1600" dirty="0">
+                <a:solidFill>
+                  <a:schemeClr val="bg1"/>
+                </a:solidFill>
+                <a:latin typeface="Inter" panose="020B0604020202020204" charset="0"/>
+                <a:ea typeface="Inter" panose="020B0604020202020204" charset="0"/>
+              </a:rPr>
+              <a:t> </a:t>
+            </a:r>
+            <a:br>
+              <a:rPr lang="en-US" sz="1600" dirty="0">
+                <a:solidFill>
+                  <a:schemeClr val="bg1"/>
+                </a:solidFill>
+                <a:latin typeface="Inter" panose="020B0604020202020204" charset="0"/>
+                <a:ea typeface="Inter" panose="020B0604020202020204" charset="0"/>
+              </a:rPr>
+            </a:br>
+            <a:r>
+              <a:rPr lang="en-US" sz="1600" dirty="0">
+                <a:solidFill>
+                  <a:schemeClr val="bg1"/>
+                </a:solidFill>
+                <a:latin typeface="Inter" panose="020B0604020202020204" charset="0"/>
+                <a:ea typeface="Inter" panose="020B0604020202020204" charset="0"/>
+              </a:rPr>
+              <a:t>Data governance Keys aspects </a:t>
+            </a:r>
+            <a:br>
+              <a:rPr lang="en-US" sz="1600" dirty="0">
+                <a:solidFill>
+                  <a:schemeClr val="bg1"/>
+                </a:solidFill>
+                <a:latin typeface="Inter" panose="020B0604020202020204" charset="0"/>
+                <a:ea typeface="Inter" panose="020B0604020202020204" charset="0"/>
+              </a:rPr>
+            </a:br>
+            <a:br>
+              <a:rPr lang="en-US" sz="1600" b="1" dirty="0">
+                <a:solidFill>
+                  <a:schemeClr val="bg1"/>
+                </a:solidFill>
+                <a:latin typeface="Inter" panose="020B0604020202020204" charset="0"/>
+                <a:ea typeface="Inter" panose="020B0604020202020204" charset="0"/>
+              </a:rPr>
+            </a:br>
+            <a:r>
+              <a:rPr lang="en-US" sz="1600" b="1" dirty="0">
+                <a:solidFill>
+                  <a:schemeClr val="bg1"/>
+                </a:solidFill>
+                <a:latin typeface="Inter" panose="020B0604020202020204" charset="0"/>
+                <a:ea typeface="Inter" panose="020B0604020202020204" charset="0"/>
+              </a:rPr>
+              <a:t>3- Implementation pilot plan </a:t>
+            </a:r>
+            <a:br>
+              <a:rPr lang="en-US" sz="1600" dirty="0">
+                <a:solidFill>
+                  <a:schemeClr val="bg1"/>
+                </a:solidFill>
+                <a:latin typeface="Inter" panose="020B0604020202020204" charset="0"/>
+                <a:ea typeface="Inter" panose="020B0604020202020204" charset="0"/>
+              </a:rPr>
+            </a:br>
+            <a:r>
+              <a:rPr lang="en-US" sz="1600" b="1" dirty="0">
+                <a:solidFill>
+                  <a:schemeClr val="bg1"/>
+                </a:solidFill>
+                <a:latin typeface="Inter" panose="020B0604020202020204" charset="0"/>
+                <a:ea typeface="Inter" panose="020B0604020202020204" charset="0"/>
+              </a:rPr>
+              <a:t>4- Expected outcomes </a:t>
+            </a:r>
+            <a:br>
+              <a:rPr lang="en-US" sz="1600" dirty="0">
+                <a:solidFill>
+                  <a:schemeClr val="bg1"/>
+                </a:solidFill>
+                <a:latin typeface="Inter" panose="020B0604020202020204" charset="0"/>
+                <a:ea typeface="Inter" panose="020B0604020202020204" charset="0"/>
+              </a:rPr>
+            </a:br>
+            <a:r>
+              <a:rPr lang="en-US" sz="1600" b="1" dirty="0">
+                <a:solidFill>
+                  <a:schemeClr val="bg1"/>
+                </a:solidFill>
+                <a:latin typeface="Inter" panose="020B0604020202020204" charset="0"/>
+                <a:ea typeface="Inter" panose="020B0604020202020204" charset="0"/>
+              </a:rPr>
+              <a:t>5- Next steps </a:t>
+            </a:r>
+            <a:endParaRPr sz="1600" b="1" dirty="0">
+              <a:solidFill>
+                <a:schemeClr val="bg1"/>
+              </a:solidFill>
+              <a:latin typeface="Inter" panose="020B0604020202020204" charset="0"/>
+              <a:ea typeface="Inter" panose="020B0604020202020204" charset="0"/>
+            </a:endParaRPr>
+          </a:p>
+        </p:txBody>
+      </p:sp>
+    </p:spTree>
+    <p:extLst>
+      <p:ext uri="{BB962C8B-B14F-4D97-AF65-F5344CB8AC3E}">
+        <p14:creationId xmlns:p14="http://schemas.microsoft.com/office/powerpoint/2010/main" val="2210348277"/>
+      </p:ext>
+    </p:extLst>
+  </p:cSld>
+  <p:clrMapOvr>
+    <a:masterClrMapping/>
+  </p:clrMapOvr>
+</p:sld>
+</file>
+
+<file path=ppt/slides/slide3.xml><?xml version="1.0" encoding="utf-8"?>
+<p:sld xmlns:a="http://schemas.openxmlformats.org/drawingml/2006/main" xmlns:r="http://schemas.openxmlformats.org/officeDocument/2006/relationships" xmlns:p="http://schemas.openxmlformats.org/presentationml/2006/main">
+  <p:cSld>
     <p:spTree>
       <p:nvGrpSpPr>
         <p:cNvPr id="1" name="Shape 67"/>
@@ -15245,7 +16212,7 @@
 </p:sld>
 </file>
 
-<file path=ppt/slides/slide3.xml><?xml version="1.0" encoding="utf-8"?>
+<file path=ppt/slides/slide4.xml><?xml version="1.0" encoding="utf-8"?>
 <p:sld xmlns:a="http://schemas.openxmlformats.org/drawingml/2006/main" xmlns:r="http://schemas.openxmlformats.org/officeDocument/2006/relationships" xmlns:p="http://schemas.openxmlformats.org/presentationml/2006/main">
   <p:cSld>
     <p:spTree>
@@ -15501,7 +16468,7 @@
 </p:sld>
 </file>
 
-<file path=ppt/slides/slide4.xml><?xml version="1.0" encoding="utf-8"?>
+<file path=ppt/slides/slide5.xml><?xml version="1.0" encoding="utf-8"?>
 <p:sld xmlns:a="http://schemas.openxmlformats.org/drawingml/2006/main" xmlns:r="http://schemas.openxmlformats.org/officeDocument/2006/relationships" xmlns:p="http://schemas.openxmlformats.org/presentationml/2006/main">
   <p:cSld>
     <p:spTree>
@@ -15772,7 +16739,7 @@
 </p:sld>
 </file>
 
-<file path=ppt/slides/slide5.xml><?xml version="1.0" encoding="utf-8"?>
+<file path=ppt/slides/slide6.xml><?xml version="1.0" encoding="utf-8"?>
 <p:sld xmlns:a="http://schemas.openxmlformats.org/drawingml/2006/main" xmlns:r="http://schemas.openxmlformats.org/officeDocument/2006/relationships" xmlns:p="http://schemas.openxmlformats.org/presentationml/2006/main">
   <p:cSld name="Slide 1">
     <p:spTree>
@@ -17174,7 +18141,7 @@
 </p:sld>
 </file>
 
-<file path=ppt/slides/slide6.xml><?xml version="1.0" encoding="utf-8"?>
+<file path=ppt/slides/slide7.xml><?xml version="1.0" encoding="utf-8"?>
 <p:sld xmlns:a="http://schemas.openxmlformats.org/drawingml/2006/main" xmlns:r="http://schemas.openxmlformats.org/officeDocument/2006/relationships" xmlns:p="http://schemas.openxmlformats.org/presentationml/2006/main">
   <p:cSld name="Slide 1">
     <p:spTree>
@@ -18879,7 +19846,7 @@
 </p:sld>
 </file>
 
-<file path=ppt/slides/slide7.xml><?xml version="1.0" encoding="utf-8"?>
+<file path=ppt/slides/slide8.xml><?xml version="1.0" encoding="utf-8"?>
 <p:sld xmlns:a="http://schemas.openxmlformats.org/drawingml/2006/main" xmlns:r="http://schemas.openxmlformats.org/officeDocument/2006/relationships" xmlns:p="http://schemas.openxmlformats.org/presentationml/2006/main">
   <p:cSld>
     <p:spTree>
@@ -19105,7 +20072,7 @@
 </p:sld>
 </file>
 
-<file path=ppt/slides/slide8.xml><?xml version="1.0" encoding="utf-8"?>
+<file path=ppt/slides/slide9.xml><?xml version="1.0" encoding="utf-8"?>
 <p:sld xmlns:a="http://schemas.openxmlformats.org/drawingml/2006/main" xmlns:r="http://schemas.openxmlformats.org/officeDocument/2006/relationships" xmlns:p="http://schemas.openxmlformats.org/presentationml/2006/main">
   <p:cSld>
     <p:spTree>
@@ -19624,218 +20591,6 @@
           </a:p>
         </p:txBody>
       </p:sp>
-    </p:spTree>
-  </p:cSld>
-  <p:clrMapOvr>
-    <a:masterClrMapping/>
-  </p:clrMapOvr>
-</p:sld>
-</file>
-
-<file path=ppt/slides/slide9.xml><?xml version="1.0" encoding="utf-8"?>
-<p:sld xmlns:a="http://schemas.openxmlformats.org/drawingml/2006/main" xmlns:r="http://schemas.openxmlformats.org/officeDocument/2006/relationships" xmlns:p="http://schemas.openxmlformats.org/presentationml/2006/main">
-  <p:cSld>
-    <p:spTree>
-      <p:nvGrpSpPr>
-        <p:cNvPr id="1" name="Shape 146"/>
-        <p:cNvGrpSpPr/>
-        <p:nvPr/>
-      </p:nvGrpSpPr>
-      <p:grpSpPr>
-        <a:xfrm>
-          <a:off x="0" y="0"/>
-          <a:ext cx="0" cy="0"/>
-          <a:chOff x="0" y="0"/>
-          <a:chExt cx="0" cy="0"/>
-        </a:xfrm>
-      </p:grpSpPr>
-      <p:sp>
-        <p:nvSpPr>
-          <p:cNvPr id="147" name="Google Shape;147;p13"/>
-          <p:cNvSpPr txBox="1">
-            <a:spLocks noGrp="1"/>
-          </p:cNvSpPr>
-          <p:nvPr>
-            <p:ph type="ctrTitle" idx="4294967295"/>
-          </p:nvPr>
-        </p:nvSpPr>
-        <p:spPr>
-          <a:xfrm>
-            <a:off x="1192664" y="403309"/>
-            <a:ext cx="5315100" cy="533100"/>
-          </a:xfrm>
-          <a:prstGeom prst="rect">
-            <a:avLst/>
-          </a:prstGeom>
-          <a:noFill/>
-          <a:ln>
-            <a:noFill/>
-          </a:ln>
-        </p:spPr>
-        <p:txBody>
-          <a:bodyPr spcFirstLastPara="1" wrap="square" lIns="91425" tIns="91425" rIns="91425" bIns="91425" anchor="t" anchorCtr="0">
-            <a:noAutofit/>
-          </a:bodyPr>
-          <a:lstStyle/>
-          <a:p>
-            <a:pPr marL="0" marR="0" lvl="0" indent="0" algn="l" rtl="0">
-              <a:lnSpc>
-                <a:spcPct val="100000"/>
-              </a:lnSpc>
-              <a:spcBef>
-                <a:spcPts val="0"/>
-              </a:spcBef>
-              <a:spcAft>
-                <a:spcPts val="0"/>
-              </a:spcAft>
-              <a:buClr>
-                <a:schemeClr val="dk1"/>
-              </a:buClr>
-              <a:buSzPts val="2800"/>
-              <a:buFont typeface="Arial"/>
-              <a:buNone/>
-            </a:pPr>
-            <a:r>
-              <a:rPr lang="en-GB" sz="2500" dirty="0">
-                <a:solidFill>
-                  <a:srgbClr val="0E3449"/>
-                </a:solidFill>
-                <a:latin typeface="Inter SemiBold"/>
-                <a:ea typeface="Inter SemiBold"/>
-                <a:cs typeface="Inter SemiBold"/>
-                <a:sym typeface="Inter SemiBold"/>
-              </a:rPr>
-              <a:t>4</a:t>
-            </a:r>
-            <a:r>
-              <a:rPr lang="en-GB" sz="2500" b="0" i="0" u="none" strike="noStrike" cap="none" dirty="0">
-                <a:solidFill>
-                  <a:srgbClr val="0E3449"/>
-                </a:solidFill>
-                <a:latin typeface="Inter SemiBold"/>
-                <a:ea typeface="Inter SemiBold"/>
-                <a:cs typeface="Inter SemiBold"/>
-                <a:sym typeface="Inter SemiBold"/>
-              </a:rPr>
-              <a:t>. Next Steps</a:t>
-            </a:r>
-            <a:endParaRPr dirty="0"/>
-          </a:p>
-        </p:txBody>
-      </p:sp>
-      <p:pic>
-        <p:nvPicPr>
-          <p:cNvPr id="148" name="Google Shape;148;p13"/>
-          <p:cNvPicPr preferRelativeResize="0"/>
-          <p:nvPr/>
-        </p:nvPicPr>
-        <p:blipFill rotWithShape="1">
-          <a:blip r:embed="rId3">
-            <a:alphaModFix/>
-          </a:blip>
-          <a:srcRect/>
-          <a:stretch/>
-        </p:blipFill>
-        <p:spPr>
-          <a:xfrm>
-            <a:off x="463375" y="482852"/>
-            <a:ext cx="576900" cy="385904"/>
-          </a:xfrm>
-          <a:prstGeom prst="rect">
-            <a:avLst/>
-          </a:prstGeom>
-          <a:noFill/>
-          <a:ln>
-            <a:noFill/>
-          </a:ln>
-        </p:spPr>
-      </p:pic>
-      <p:sp>
-        <p:nvSpPr>
-          <p:cNvPr id="149" name="Google Shape;149;p13"/>
-          <p:cNvSpPr/>
-          <p:nvPr/>
-        </p:nvSpPr>
-        <p:spPr>
-          <a:xfrm>
-            <a:off x="10225" y="4892025"/>
-            <a:ext cx="9144000" cy="251400"/>
-          </a:xfrm>
-          <a:prstGeom prst="rect">
-            <a:avLst/>
-          </a:prstGeom>
-          <a:solidFill>
-            <a:srgbClr val="C3FFFC"/>
-          </a:solidFill>
-          <a:ln>
-            <a:noFill/>
-          </a:ln>
-        </p:spPr>
-        <p:txBody>
-          <a:bodyPr spcFirstLastPara="1" wrap="square" lIns="91425" tIns="91425" rIns="91425" bIns="91425" anchor="ctr" anchorCtr="0">
-            <a:noAutofit/>
-          </a:bodyPr>
-          <a:lstStyle/>
-          <a:p>
-            <a:pPr marL="0" marR="0" lvl="0" indent="0" algn="l" rtl="0">
-              <a:lnSpc>
-                <a:spcPct val="100000"/>
-              </a:lnSpc>
-              <a:spcBef>
-                <a:spcPts val="0"/>
-              </a:spcBef>
-              <a:spcAft>
-                <a:spcPts val="0"/>
-              </a:spcAft>
-              <a:buClr>
-                <a:srgbClr val="000000"/>
-              </a:buClr>
-              <a:buSzPts val="1400"/>
-              <a:buFont typeface="Arial"/>
-              <a:buNone/>
-            </a:pPr>
-            <a:endParaRPr sz="1400" b="0" i="0" u="none" strike="noStrike" cap="none">
-              <a:solidFill>
-                <a:srgbClr val="000000"/>
-              </a:solidFill>
-              <a:latin typeface="Arial"/>
-              <a:ea typeface="Arial"/>
-              <a:cs typeface="Arial"/>
-              <a:sym typeface="Arial"/>
-            </a:endParaRPr>
-          </a:p>
-        </p:txBody>
-      </p:sp>
-      <p:pic>
-        <p:nvPicPr>
-          <p:cNvPr id="5" name="Image 4">
-            <a:extLst>
-              <a:ext uri="{FF2B5EF4-FFF2-40B4-BE49-F238E27FC236}">
-                <a16:creationId xmlns:a16="http://schemas.microsoft.com/office/drawing/2014/main" id="{42187B91-F87A-D2BB-1390-9CCCDD7745C4}"/>
-              </a:ext>
-            </a:extLst>
-          </p:cNvPr>
-          <p:cNvPicPr>
-            <a:picLocks noChangeAspect="1"/>
-          </p:cNvPicPr>
-          <p:nvPr/>
-        </p:nvPicPr>
-        <p:blipFill>
-          <a:blip r:embed="rId4"/>
-          <a:stretch>
-            <a:fillRect/>
-          </a:stretch>
-        </p:blipFill>
-        <p:spPr>
-          <a:xfrm>
-            <a:off x="823993" y="1195754"/>
-            <a:ext cx="7910622" cy="3270738"/>
-          </a:xfrm>
-          <a:prstGeom prst="rect">
-            <a:avLst/>
-          </a:prstGeom>
-        </p:spPr>
-      </p:pic>
     </p:spTree>
   </p:cSld>
   <p:clrMapOvr>

</xml_diff>